<commit_message>
elaboración todas las secciones de artículo
</commit_message>
<xml_diff>
--- a/articulo ieee/Diagramación.pptx
+++ b/articulo ieee/Diagramación.pptx
@@ -6,6 +6,9 @@
   </p:sldMasterIdLst>
   <p:sldIdLst>
     <p:sldId id="256" r:id="rId2"/>
+    <p:sldId id="257" r:id="rId3"/>
+    <p:sldId id="258" r:id="rId4"/>
+    <p:sldId id="259" r:id="rId5"/>
   </p:sldIdLst>
   <p:sldSz cx="12192000" cy="6858000"/>
   <p:notesSz cx="6858000" cy="9144000"/>
@@ -104,6 +107,11 @@
       </a:defRPr>
     </a:lvl9pPr>
   </p:defaultTextStyle>
+  <p:extLst>
+    <p:ext uri="{EFAFB233-063F-42B5-8137-9DF3F51BA10A}">
+      <p15:sldGuideLst xmlns:p15="http://schemas.microsoft.com/office/powerpoint/2012/main"/>
+    </p:ext>
+  </p:extLst>
 </p:presentation>
 </file>
 
@@ -256,7 +264,7 @@
           <a:p>
             <a:fld id="{F47E2ED1-A0BF-44BF-8C4E-352168837612}" type="datetimeFigureOut">
               <a:rPr lang="es-CO" smtClean="0"/>
-              <a:t>20/12/2020</a:t>
+              <a:t>24/01/2022</a:t>
             </a:fld>
             <a:endParaRPr lang="es-CO"/>
           </a:p>
@@ -456,7 +464,7 @@
           <a:p>
             <a:fld id="{F47E2ED1-A0BF-44BF-8C4E-352168837612}" type="datetimeFigureOut">
               <a:rPr lang="es-CO" smtClean="0"/>
-              <a:t>20/12/2020</a:t>
+              <a:t>24/01/2022</a:t>
             </a:fld>
             <a:endParaRPr lang="es-CO"/>
           </a:p>
@@ -666,7 +674,7 @@
           <a:p>
             <a:fld id="{F47E2ED1-A0BF-44BF-8C4E-352168837612}" type="datetimeFigureOut">
               <a:rPr lang="es-CO" smtClean="0"/>
-              <a:t>20/12/2020</a:t>
+              <a:t>24/01/2022</a:t>
             </a:fld>
             <a:endParaRPr lang="es-CO"/>
           </a:p>
@@ -866,7 +874,7 @@
           <a:p>
             <a:fld id="{F47E2ED1-A0BF-44BF-8C4E-352168837612}" type="datetimeFigureOut">
               <a:rPr lang="es-CO" smtClean="0"/>
-              <a:t>20/12/2020</a:t>
+              <a:t>24/01/2022</a:t>
             </a:fld>
             <a:endParaRPr lang="es-CO"/>
           </a:p>
@@ -1142,7 +1150,7 @@
           <a:p>
             <a:fld id="{F47E2ED1-A0BF-44BF-8C4E-352168837612}" type="datetimeFigureOut">
               <a:rPr lang="es-CO" smtClean="0"/>
-              <a:t>20/12/2020</a:t>
+              <a:t>24/01/2022</a:t>
             </a:fld>
             <a:endParaRPr lang="es-CO"/>
           </a:p>
@@ -1410,7 +1418,7 @@
           <a:p>
             <a:fld id="{F47E2ED1-A0BF-44BF-8C4E-352168837612}" type="datetimeFigureOut">
               <a:rPr lang="es-CO" smtClean="0"/>
-              <a:t>20/12/2020</a:t>
+              <a:t>24/01/2022</a:t>
             </a:fld>
             <a:endParaRPr lang="es-CO"/>
           </a:p>
@@ -1825,7 +1833,7 @@
           <a:p>
             <a:fld id="{F47E2ED1-A0BF-44BF-8C4E-352168837612}" type="datetimeFigureOut">
               <a:rPr lang="es-CO" smtClean="0"/>
-              <a:t>20/12/2020</a:t>
+              <a:t>24/01/2022</a:t>
             </a:fld>
             <a:endParaRPr lang="es-CO"/>
           </a:p>
@@ -1967,7 +1975,7 @@
           <a:p>
             <a:fld id="{F47E2ED1-A0BF-44BF-8C4E-352168837612}" type="datetimeFigureOut">
               <a:rPr lang="es-CO" smtClean="0"/>
-              <a:t>20/12/2020</a:t>
+              <a:t>24/01/2022</a:t>
             </a:fld>
             <a:endParaRPr lang="es-CO"/>
           </a:p>
@@ -2080,7 +2088,7 @@
           <a:p>
             <a:fld id="{F47E2ED1-A0BF-44BF-8C4E-352168837612}" type="datetimeFigureOut">
               <a:rPr lang="es-CO" smtClean="0"/>
-              <a:t>20/12/2020</a:t>
+              <a:t>24/01/2022</a:t>
             </a:fld>
             <a:endParaRPr lang="es-CO"/>
           </a:p>
@@ -2393,7 +2401,7 @@
           <a:p>
             <a:fld id="{F47E2ED1-A0BF-44BF-8C4E-352168837612}" type="datetimeFigureOut">
               <a:rPr lang="es-CO" smtClean="0"/>
-              <a:t>20/12/2020</a:t>
+              <a:t>24/01/2022</a:t>
             </a:fld>
             <a:endParaRPr lang="es-CO"/>
           </a:p>
@@ -2682,7 +2690,7 @@
           <a:p>
             <a:fld id="{F47E2ED1-A0BF-44BF-8C4E-352168837612}" type="datetimeFigureOut">
               <a:rPr lang="es-CO" smtClean="0"/>
-              <a:t>20/12/2020</a:t>
+              <a:t>24/01/2022</a:t>
             </a:fld>
             <a:endParaRPr lang="es-CO"/>
           </a:p>
@@ -2925,7 +2933,7 @@
           <a:p>
             <a:fld id="{F47E2ED1-A0BF-44BF-8C4E-352168837612}" type="datetimeFigureOut">
               <a:rPr lang="es-CO" smtClean="0"/>
-              <a:t>20/12/2020</a:t>
+              <a:t>24/01/2022</a:t>
             </a:fld>
             <a:endParaRPr lang="es-CO"/>
           </a:p>
@@ -3435,6 +3443,240 @@
 </p:sld>
 </file>
 
+<file path=ppt/slides/slide2.xml><?xml version="1.0" encoding="utf-8"?>
+<p:sld xmlns:a="http://schemas.openxmlformats.org/drawingml/2006/main" xmlns:r="http://schemas.openxmlformats.org/officeDocument/2006/relationships" xmlns:p="http://schemas.openxmlformats.org/presentationml/2006/main">
+  <p:cSld>
+    <p:spTree>
+      <p:nvGrpSpPr>
+        <p:cNvPr id="1" name=""/>
+        <p:cNvGrpSpPr/>
+        <p:nvPr/>
+      </p:nvGrpSpPr>
+      <p:grpSpPr>
+        <a:xfrm>
+          <a:off x="0" y="0"/>
+          <a:ext cx="0" cy="0"/>
+          <a:chOff x="0" y="0"/>
+          <a:chExt cx="0" cy="0"/>
+        </a:xfrm>
+      </p:grpSpPr>
+      <p:pic>
+        <p:nvPicPr>
+          <p:cNvPr id="2" name="Picture 1">
+            <a:extLst>
+              <a:ext uri="{FF2B5EF4-FFF2-40B4-BE49-F238E27FC236}">
+                <a16:creationId xmlns:a16="http://schemas.microsoft.com/office/drawing/2014/main" id="{029C1D25-0884-49C4-8BC3-EF6297FDA1EC}"/>
+              </a:ext>
+            </a:extLst>
+          </p:cNvPr>
+          <p:cNvPicPr>
+            <a:picLocks noChangeAspect="1"/>
+          </p:cNvPicPr>
+          <p:nvPr/>
+        </p:nvPicPr>
+        <p:blipFill rotWithShape="1">
+          <a:blip r:embed="rId2"/>
+          <a:srcRect l="1" r="476"/>
+          <a:stretch/>
+        </p:blipFill>
+        <p:spPr>
+          <a:xfrm>
+            <a:off x="1581301" y="0"/>
+            <a:ext cx="8986385" cy="6858000"/>
+          </a:xfrm>
+          <a:prstGeom prst="rect">
+            <a:avLst/>
+          </a:prstGeom>
+        </p:spPr>
+      </p:pic>
+    </p:spTree>
+    <p:extLst>
+      <p:ext uri="{BB962C8B-B14F-4D97-AF65-F5344CB8AC3E}">
+        <p14:creationId xmlns:p14="http://schemas.microsoft.com/office/powerpoint/2010/main" val="3474964310"/>
+      </p:ext>
+    </p:extLst>
+  </p:cSld>
+  <p:clrMapOvr>
+    <a:masterClrMapping/>
+  </p:clrMapOvr>
+</p:sld>
+</file>
+
+<file path=ppt/slides/slide3.xml><?xml version="1.0" encoding="utf-8"?>
+<p:sld xmlns:a="http://schemas.openxmlformats.org/drawingml/2006/main" xmlns:r="http://schemas.openxmlformats.org/officeDocument/2006/relationships" xmlns:p="http://schemas.openxmlformats.org/presentationml/2006/main">
+  <p:cSld>
+    <p:spTree>
+      <p:nvGrpSpPr>
+        <p:cNvPr id="1" name=""/>
+        <p:cNvGrpSpPr/>
+        <p:nvPr/>
+      </p:nvGrpSpPr>
+      <p:grpSpPr>
+        <a:xfrm>
+          <a:off x="0" y="0"/>
+          <a:ext cx="0" cy="0"/>
+          <a:chOff x="0" y="0"/>
+          <a:chExt cx="0" cy="0"/>
+        </a:xfrm>
+      </p:grpSpPr>
+      <p:grpSp>
+        <p:nvGrpSpPr>
+          <p:cNvPr id="5" name="Group 4">
+            <a:extLst>
+              <a:ext uri="{FF2B5EF4-FFF2-40B4-BE49-F238E27FC236}">
+                <a16:creationId xmlns:a16="http://schemas.microsoft.com/office/drawing/2014/main" id="{04373032-D8FF-4D80-A9F0-D547EF60D480}"/>
+              </a:ext>
+            </a:extLst>
+          </p:cNvPr>
+          <p:cNvGrpSpPr/>
+          <p:nvPr/>
+        </p:nvGrpSpPr>
+        <p:grpSpPr>
+          <a:xfrm>
+            <a:off x="0" y="709107"/>
+            <a:ext cx="12192000" cy="5439786"/>
+            <a:chOff x="0" y="709107"/>
+            <a:chExt cx="12192000" cy="5439786"/>
+          </a:xfrm>
+        </p:grpSpPr>
+        <p:pic>
+          <p:nvPicPr>
+            <p:cNvPr id="3" name="Picture 2">
+              <a:extLst>
+                <a:ext uri="{FF2B5EF4-FFF2-40B4-BE49-F238E27FC236}">
+                  <a16:creationId xmlns:a16="http://schemas.microsoft.com/office/drawing/2014/main" id="{15C1CF80-6FCF-4BC5-A711-638F51E3AAD2}"/>
+                </a:ext>
+              </a:extLst>
+            </p:cNvPr>
+            <p:cNvPicPr>
+              <a:picLocks noChangeAspect="1"/>
+            </p:cNvPicPr>
+            <p:nvPr/>
+          </p:nvPicPr>
+          <p:blipFill>
+            <a:blip r:embed="rId2"/>
+            <a:stretch>
+              <a:fillRect/>
+            </a:stretch>
+          </p:blipFill>
+          <p:spPr>
+            <a:xfrm>
+              <a:off x="0" y="709107"/>
+              <a:ext cx="12192000" cy="5439786"/>
+            </a:xfrm>
+            <a:prstGeom prst="rect">
+              <a:avLst/>
+            </a:prstGeom>
+          </p:spPr>
+        </p:pic>
+        <p:pic>
+          <p:nvPicPr>
+            <p:cNvPr id="4" name="Picture 3">
+              <a:extLst>
+                <a:ext uri="{FF2B5EF4-FFF2-40B4-BE49-F238E27FC236}">
+                  <a16:creationId xmlns:a16="http://schemas.microsoft.com/office/drawing/2014/main" id="{27B27CD3-72DC-4EE6-BE06-60D45A29E907}"/>
+                </a:ext>
+              </a:extLst>
+            </p:cNvPr>
+            <p:cNvPicPr>
+              <a:picLocks noChangeAspect="1"/>
+            </p:cNvPicPr>
+            <p:nvPr/>
+          </p:nvPicPr>
+          <p:blipFill rotWithShape="1">
+            <a:blip r:embed="rId2"/>
+            <a:srcRect l="8955" r="72725" b="95996"/>
+            <a:stretch/>
+          </p:blipFill>
+          <p:spPr>
+            <a:xfrm>
+              <a:off x="119921" y="724097"/>
+              <a:ext cx="2233534" cy="217785"/>
+            </a:xfrm>
+            <a:prstGeom prst="rect">
+              <a:avLst/>
+            </a:prstGeom>
+          </p:spPr>
+        </p:pic>
+      </p:grpSp>
+    </p:spTree>
+    <p:extLst>
+      <p:ext uri="{BB962C8B-B14F-4D97-AF65-F5344CB8AC3E}">
+        <p14:creationId xmlns:p14="http://schemas.microsoft.com/office/powerpoint/2010/main" val="2398276714"/>
+      </p:ext>
+    </p:extLst>
+  </p:cSld>
+  <p:clrMapOvr>
+    <a:masterClrMapping/>
+  </p:clrMapOvr>
+</p:sld>
+</file>
+
+<file path=ppt/slides/slide4.xml><?xml version="1.0" encoding="utf-8"?>
+<p:sld xmlns:a="http://schemas.openxmlformats.org/drawingml/2006/main" xmlns:r="http://schemas.openxmlformats.org/officeDocument/2006/relationships" xmlns:p="http://schemas.openxmlformats.org/presentationml/2006/main">
+  <p:cSld>
+    <p:spTree>
+      <p:nvGrpSpPr>
+        <p:cNvPr id="1" name=""/>
+        <p:cNvGrpSpPr/>
+        <p:nvPr/>
+      </p:nvGrpSpPr>
+      <p:grpSpPr>
+        <a:xfrm>
+          <a:off x="0" y="0"/>
+          <a:ext cx="0" cy="0"/>
+          <a:chOff x="0" y="0"/>
+          <a:chExt cx="0" cy="0"/>
+        </a:xfrm>
+      </p:grpSpPr>
+      <p:pic>
+        <p:nvPicPr>
+          <p:cNvPr id="3" name="Picture 2" descr="Diagram&#10;&#10;Description automatically generated">
+            <a:extLst>
+              <a:ext uri="{FF2B5EF4-FFF2-40B4-BE49-F238E27FC236}">
+                <a16:creationId xmlns:a16="http://schemas.microsoft.com/office/drawing/2014/main" id="{146555B9-1AC5-444F-A5FD-CB8D752C6579}"/>
+              </a:ext>
+            </a:extLst>
+          </p:cNvPr>
+          <p:cNvPicPr>
+            <a:picLocks noChangeAspect="1"/>
+          </p:cNvPicPr>
+          <p:nvPr/>
+        </p:nvPicPr>
+        <p:blipFill rotWithShape="1">
+          <a:blip r:embed="rId2">
+            <a:extLst>
+              <a:ext uri="{28A0092B-C50C-407E-A947-70E740481C1C}">
+                <a14:useLocalDpi xmlns:a14="http://schemas.microsoft.com/office/drawing/2010/main" val="0"/>
+              </a:ext>
+            </a:extLst>
+          </a:blip>
+          <a:srcRect l="3737" t="1659" b="6305"/>
+          <a:stretch/>
+        </p:blipFill>
+        <p:spPr>
+          <a:xfrm>
+            <a:off x="4241799" y="304801"/>
+            <a:ext cx="3858161" cy="6311900"/>
+          </a:xfrm>
+          <a:prstGeom prst="rect">
+            <a:avLst/>
+          </a:prstGeom>
+        </p:spPr>
+      </p:pic>
+    </p:spTree>
+    <p:extLst>
+      <p:ext uri="{BB962C8B-B14F-4D97-AF65-F5344CB8AC3E}">
+        <p14:creationId xmlns:p14="http://schemas.microsoft.com/office/powerpoint/2010/main" val="2174388417"/>
+      </p:ext>
+    </p:extLst>
+  </p:cSld>
+  <p:clrMapOvr>
+    <a:masterClrMapping/>
+  </p:clrMapOvr>
+</p:sld>
+</file>
+
 <file path=ppt/theme/theme1.xml><?xml version="1.0" encoding="utf-8"?>
 <a:theme xmlns:a="http://schemas.openxmlformats.org/drawingml/2006/main" name="Office Theme">
   <a:themeElements>

</xml_diff>